<commit_message>
Updated animation in presentation
</commit_message>
<xml_diff>
--- a/Lesson 1/Lesson 1-Introduction.pptx
+++ b/Lesson 1/Lesson 1-Introduction.pptx
@@ -111,6 +111,11 @@
       </a:defRPr>
     </a:lvl9pPr>
   </p:defaultTextStyle>
+  <p:extLst>
+    <p:ext uri="{EFAFB233-063F-42B5-8137-9DF3F51BA10A}">
+      <p15:sldGuideLst xmlns:p15="http://schemas.microsoft.com/office/powerpoint/2012/main"/>
+    </p:ext>
+  </p:extLst>
 </p:presentation>
 </file>
 
@@ -5844,6 +5849,13 @@
   <p:clrMapOvr>
     <a:masterClrMapping/>
   </p:clrMapOvr>
+  <p:timing>
+    <p:tnLst>
+      <p:par>
+        <p:cTn id="1" dur="indefinite" restart="never" nodeType="tmRoot"/>
+      </p:par>
+    </p:tnLst>
+  </p:timing>
 </p:sld>
 </file>
 
@@ -6211,6 +6223,176 @@
   <p:clrMapOvr>
     <a:masterClrMapping/>
   </p:clrMapOvr>
+  <p:timing>
+    <p:tnLst>
+      <p:par>
+        <p:cTn id="1" dur="indefinite" restart="never" nodeType="tmRoot">
+          <p:childTnLst>
+            <p:seq concurrent="1" nextAc="seek">
+              <p:cTn id="2" dur="indefinite" nodeType="mainSeq">
+                <p:childTnLst>
+                  <p:par>
+                    <p:cTn id="3" fill="hold">
+                      <p:stCondLst>
+                        <p:cond delay="indefinite"/>
+                      </p:stCondLst>
+                      <p:childTnLst>
+                        <p:par>
+                          <p:cTn id="4" fill="hold">
+                            <p:stCondLst>
+                              <p:cond delay="0"/>
+                            </p:stCondLst>
+                            <p:childTnLst>
+                              <p:par>
+                                <p:cTn id="5" presetID="1" presetClass="entr" presetSubtype="0" fill="hold" grpId="0" nodeType="clickEffect">
+                                  <p:stCondLst>
+                                    <p:cond delay="0"/>
+                                  </p:stCondLst>
+                                  <p:childTnLst>
+                                    <p:set>
+                                      <p:cBhvr>
+                                        <p:cTn id="6" dur="1" fill="hold">
+                                          <p:stCondLst>
+                                            <p:cond delay="0"/>
+                                          </p:stCondLst>
+                                        </p:cTn>
+                                        <p:tgtEl>
+                                          <p:spTgt spid="2"/>
+                                        </p:tgtEl>
+                                        <p:attrNameLst>
+                                          <p:attrName>style.visibility</p:attrName>
+                                        </p:attrNameLst>
+                                      </p:cBhvr>
+                                      <p:to>
+                                        <p:strVal val="visible"/>
+                                      </p:to>
+                                    </p:set>
+                                  </p:childTnLst>
+                                </p:cTn>
+                              </p:par>
+                            </p:childTnLst>
+                          </p:cTn>
+                        </p:par>
+                      </p:childTnLst>
+                    </p:cTn>
+                  </p:par>
+                  <p:par>
+                    <p:cTn id="7" fill="hold">
+                      <p:stCondLst>
+                        <p:cond delay="indefinite"/>
+                      </p:stCondLst>
+                      <p:childTnLst>
+                        <p:par>
+                          <p:cTn id="8" fill="hold">
+                            <p:stCondLst>
+                              <p:cond delay="0"/>
+                            </p:stCondLst>
+                            <p:childTnLst>
+                              <p:par>
+                                <p:cTn id="9" presetID="1" presetClass="entr" presetSubtype="0" fill="hold" grpId="0" nodeType="clickEffect">
+                                  <p:stCondLst>
+                                    <p:cond delay="0"/>
+                                  </p:stCondLst>
+                                  <p:childTnLst>
+                                    <p:set>
+                                      <p:cBhvr>
+                                        <p:cTn id="10" dur="1" fill="hold">
+                                          <p:stCondLst>
+                                            <p:cond delay="0"/>
+                                          </p:stCondLst>
+                                        </p:cTn>
+                                        <p:tgtEl>
+                                          <p:spTgt spid="5"/>
+                                        </p:tgtEl>
+                                        <p:attrNameLst>
+                                          <p:attrName>style.visibility</p:attrName>
+                                        </p:attrNameLst>
+                                      </p:cBhvr>
+                                      <p:to>
+                                        <p:strVal val="visible"/>
+                                      </p:to>
+                                    </p:set>
+                                  </p:childTnLst>
+                                </p:cTn>
+                              </p:par>
+                            </p:childTnLst>
+                          </p:cTn>
+                        </p:par>
+                      </p:childTnLst>
+                    </p:cTn>
+                  </p:par>
+                  <p:par>
+                    <p:cTn id="11" fill="hold">
+                      <p:stCondLst>
+                        <p:cond delay="indefinite"/>
+                      </p:stCondLst>
+                      <p:childTnLst>
+                        <p:par>
+                          <p:cTn id="12" fill="hold">
+                            <p:stCondLst>
+                              <p:cond delay="0"/>
+                            </p:stCondLst>
+                            <p:childTnLst>
+                              <p:par>
+                                <p:cTn id="13" presetID="1" presetClass="entr" presetSubtype="0" fill="hold" grpId="0" nodeType="clickEffect">
+                                  <p:stCondLst>
+                                    <p:cond delay="0"/>
+                                  </p:stCondLst>
+                                  <p:childTnLst>
+                                    <p:set>
+                                      <p:cBhvr>
+                                        <p:cTn id="14" dur="1" fill="hold">
+                                          <p:stCondLst>
+                                            <p:cond delay="0"/>
+                                          </p:stCondLst>
+                                        </p:cTn>
+                                        <p:tgtEl>
+                                          <p:spTgt spid="6"/>
+                                        </p:tgtEl>
+                                        <p:attrNameLst>
+                                          <p:attrName>style.visibility</p:attrName>
+                                        </p:attrNameLst>
+                                      </p:cBhvr>
+                                      <p:to>
+                                        <p:strVal val="visible"/>
+                                      </p:to>
+                                    </p:set>
+                                  </p:childTnLst>
+                                </p:cTn>
+                              </p:par>
+                            </p:childTnLst>
+                          </p:cTn>
+                        </p:par>
+                      </p:childTnLst>
+                    </p:cTn>
+                  </p:par>
+                </p:childTnLst>
+              </p:cTn>
+              <p:prevCondLst>
+                <p:cond evt="onPrev" delay="0">
+                  <p:tgtEl>
+                    <p:sldTgt/>
+                  </p:tgtEl>
+                </p:cond>
+              </p:prevCondLst>
+              <p:nextCondLst>
+                <p:cond evt="onNext" delay="0">
+                  <p:tgtEl>
+                    <p:sldTgt/>
+                  </p:tgtEl>
+                </p:cond>
+              </p:nextCondLst>
+            </p:seq>
+          </p:childTnLst>
+        </p:cTn>
+      </p:par>
+    </p:tnLst>
+    <p:bldLst>
+      <p:bldP spid="2" grpId="0"/>
+      <p:bldP spid="5" grpId="0"/>
+      <p:bldP spid="6" grpId="0"/>
+    </p:bldLst>
+  </p:timing>
 </p:sld>
 </file>
 
@@ -6375,6 +6557,130 @@
   <p:clrMapOvr>
     <a:masterClrMapping/>
   </p:clrMapOvr>
+  <p:timing>
+    <p:tnLst>
+      <p:par>
+        <p:cTn id="1" dur="indefinite" restart="never" nodeType="tmRoot">
+          <p:childTnLst>
+            <p:seq concurrent="1" nextAc="seek">
+              <p:cTn id="2" dur="indefinite" nodeType="mainSeq">
+                <p:childTnLst>
+                  <p:par>
+                    <p:cTn id="3" fill="hold">
+                      <p:stCondLst>
+                        <p:cond delay="indefinite"/>
+                      </p:stCondLst>
+                      <p:childTnLst>
+                        <p:par>
+                          <p:cTn id="4" fill="hold">
+                            <p:stCondLst>
+                              <p:cond delay="0"/>
+                            </p:stCondLst>
+                            <p:childTnLst>
+                              <p:par>
+                                <p:cTn id="5" presetID="1" presetClass="entr" presetSubtype="0" fill="hold" grpId="0" nodeType="clickEffect">
+                                  <p:stCondLst>
+                                    <p:cond delay="0"/>
+                                  </p:stCondLst>
+                                  <p:childTnLst>
+                                    <p:set>
+                                      <p:cBhvr>
+                                        <p:cTn id="6" dur="1" fill="hold">
+                                          <p:stCondLst>
+                                            <p:cond delay="0"/>
+                                          </p:stCondLst>
+                                        </p:cTn>
+                                        <p:tgtEl>
+                                          <p:spTgt spid="2"/>
+                                        </p:tgtEl>
+                                        <p:attrNameLst>
+                                          <p:attrName>style.visibility</p:attrName>
+                                        </p:attrNameLst>
+                                      </p:cBhvr>
+                                      <p:to>
+                                        <p:strVal val="visible"/>
+                                      </p:to>
+                                    </p:set>
+                                  </p:childTnLst>
+                                </p:cTn>
+                              </p:par>
+                            </p:childTnLst>
+                          </p:cTn>
+                        </p:par>
+                      </p:childTnLst>
+                    </p:cTn>
+                  </p:par>
+                  <p:par>
+                    <p:cTn id="7" fill="hold">
+                      <p:stCondLst>
+                        <p:cond delay="indefinite"/>
+                      </p:stCondLst>
+                      <p:childTnLst>
+                        <p:par>
+                          <p:cTn id="8" fill="hold">
+                            <p:stCondLst>
+                              <p:cond delay="0"/>
+                            </p:stCondLst>
+                            <p:childTnLst>
+                              <p:par>
+                                <p:cTn id="9" presetID="1" presetClass="entr" presetSubtype="0" fill="hold" grpId="0" nodeType="clickEffect">
+                                  <p:stCondLst>
+                                    <p:cond delay="0"/>
+                                  </p:stCondLst>
+                                  <p:childTnLst>
+                                    <p:set>
+                                      <p:cBhvr>
+                                        <p:cTn id="10" dur="1" fill="hold">
+                                          <p:stCondLst>
+                                            <p:cond delay="0"/>
+                                          </p:stCondLst>
+                                        </p:cTn>
+                                        <p:tgtEl>
+                                          <p:spTgt spid="4"/>
+                                        </p:tgtEl>
+                                        <p:attrNameLst>
+                                          <p:attrName>style.visibility</p:attrName>
+                                        </p:attrNameLst>
+                                      </p:cBhvr>
+                                      <p:to>
+                                        <p:strVal val="visible"/>
+                                      </p:to>
+                                    </p:set>
+                                  </p:childTnLst>
+                                </p:cTn>
+                              </p:par>
+                            </p:childTnLst>
+                          </p:cTn>
+                        </p:par>
+                      </p:childTnLst>
+                    </p:cTn>
+                  </p:par>
+                </p:childTnLst>
+              </p:cTn>
+              <p:prevCondLst>
+                <p:cond evt="onPrev" delay="0">
+                  <p:tgtEl>
+                    <p:sldTgt/>
+                  </p:tgtEl>
+                </p:cond>
+              </p:prevCondLst>
+              <p:nextCondLst>
+                <p:cond evt="onNext" delay="0">
+                  <p:tgtEl>
+                    <p:sldTgt/>
+                  </p:tgtEl>
+                </p:cond>
+              </p:nextCondLst>
+            </p:seq>
+          </p:childTnLst>
+        </p:cTn>
+      </p:par>
+    </p:tnLst>
+    <p:bldLst>
+      <p:bldP spid="2" grpId="0"/>
+      <p:bldP spid="4" grpId="0"/>
+    </p:bldLst>
+  </p:timing>
 </p:sld>
 </file>
 
@@ -6645,6 +6951,176 @@
   <p:clrMapOvr>
     <a:masterClrMapping/>
   </p:clrMapOvr>
+  <p:timing>
+    <p:tnLst>
+      <p:par>
+        <p:cTn id="1" dur="indefinite" restart="never" nodeType="tmRoot">
+          <p:childTnLst>
+            <p:seq concurrent="1" nextAc="seek">
+              <p:cTn id="2" dur="indefinite" nodeType="mainSeq">
+                <p:childTnLst>
+                  <p:par>
+                    <p:cTn id="3" fill="hold">
+                      <p:stCondLst>
+                        <p:cond delay="indefinite"/>
+                      </p:stCondLst>
+                      <p:childTnLst>
+                        <p:par>
+                          <p:cTn id="4" fill="hold">
+                            <p:stCondLst>
+                              <p:cond delay="0"/>
+                            </p:stCondLst>
+                            <p:childTnLst>
+                              <p:par>
+                                <p:cTn id="5" presetID="1" presetClass="entr" presetSubtype="0" fill="hold" grpId="0" nodeType="clickEffect">
+                                  <p:stCondLst>
+                                    <p:cond delay="0"/>
+                                  </p:stCondLst>
+                                  <p:childTnLst>
+                                    <p:set>
+                                      <p:cBhvr>
+                                        <p:cTn id="6" dur="1" fill="hold">
+                                          <p:stCondLst>
+                                            <p:cond delay="0"/>
+                                          </p:stCondLst>
+                                        </p:cTn>
+                                        <p:tgtEl>
+                                          <p:spTgt spid="2"/>
+                                        </p:tgtEl>
+                                        <p:attrNameLst>
+                                          <p:attrName>style.visibility</p:attrName>
+                                        </p:attrNameLst>
+                                      </p:cBhvr>
+                                      <p:to>
+                                        <p:strVal val="visible"/>
+                                      </p:to>
+                                    </p:set>
+                                  </p:childTnLst>
+                                </p:cTn>
+                              </p:par>
+                            </p:childTnLst>
+                          </p:cTn>
+                        </p:par>
+                      </p:childTnLst>
+                    </p:cTn>
+                  </p:par>
+                  <p:par>
+                    <p:cTn id="7" fill="hold">
+                      <p:stCondLst>
+                        <p:cond delay="indefinite"/>
+                      </p:stCondLst>
+                      <p:childTnLst>
+                        <p:par>
+                          <p:cTn id="8" fill="hold">
+                            <p:stCondLst>
+                              <p:cond delay="0"/>
+                            </p:stCondLst>
+                            <p:childTnLst>
+                              <p:par>
+                                <p:cTn id="9" presetID="1" presetClass="entr" presetSubtype="0" fill="hold" grpId="0" nodeType="clickEffect">
+                                  <p:stCondLst>
+                                    <p:cond delay="0"/>
+                                  </p:stCondLst>
+                                  <p:childTnLst>
+                                    <p:set>
+                                      <p:cBhvr>
+                                        <p:cTn id="10" dur="1" fill="hold">
+                                          <p:stCondLst>
+                                            <p:cond delay="0"/>
+                                          </p:stCondLst>
+                                        </p:cTn>
+                                        <p:tgtEl>
+                                          <p:spTgt spid="4"/>
+                                        </p:tgtEl>
+                                        <p:attrNameLst>
+                                          <p:attrName>style.visibility</p:attrName>
+                                        </p:attrNameLst>
+                                      </p:cBhvr>
+                                      <p:to>
+                                        <p:strVal val="visible"/>
+                                      </p:to>
+                                    </p:set>
+                                  </p:childTnLst>
+                                </p:cTn>
+                              </p:par>
+                            </p:childTnLst>
+                          </p:cTn>
+                        </p:par>
+                      </p:childTnLst>
+                    </p:cTn>
+                  </p:par>
+                  <p:par>
+                    <p:cTn id="11" fill="hold">
+                      <p:stCondLst>
+                        <p:cond delay="indefinite"/>
+                      </p:stCondLst>
+                      <p:childTnLst>
+                        <p:par>
+                          <p:cTn id="12" fill="hold">
+                            <p:stCondLst>
+                              <p:cond delay="0"/>
+                            </p:stCondLst>
+                            <p:childTnLst>
+                              <p:par>
+                                <p:cTn id="13" presetID="1" presetClass="entr" presetSubtype="0" fill="hold" grpId="0" nodeType="clickEffect">
+                                  <p:stCondLst>
+                                    <p:cond delay="0"/>
+                                  </p:stCondLst>
+                                  <p:childTnLst>
+                                    <p:set>
+                                      <p:cBhvr>
+                                        <p:cTn id="14" dur="1" fill="hold">
+                                          <p:stCondLst>
+                                            <p:cond delay="0"/>
+                                          </p:stCondLst>
+                                        </p:cTn>
+                                        <p:tgtEl>
+                                          <p:spTgt spid="5"/>
+                                        </p:tgtEl>
+                                        <p:attrNameLst>
+                                          <p:attrName>style.visibility</p:attrName>
+                                        </p:attrNameLst>
+                                      </p:cBhvr>
+                                      <p:to>
+                                        <p:strVal val="visible"/>
+                                      </p:to>
+                                    </p:set>
+                                  </p:childTnLst>
+                                </p:cTn>
+                              </p:par>
+                            </p:childTnLst>
+                          </p:cTn>
+                        </p:par>
+                      </p:childTnLst>
+                    </p:cTn>
+                  </p:par>
+                </p:childTnLst>
+              </p:cTn>
+              <p:prevCondLst>
+                <p:cond evt="onPrev" delay="0">
+                  <p:tgtEl>
+                    <p:sldTgt/>
+                  </p:tgtEl>
+                </p:cond>
+              </p:prevCondLst>
+              <p:nextCondLst>
+                <p:cond evt="onNext" delay="0">
+                  <p:tgtEl>
+                    <p:sldTgt/>
+                  </p:tgtEl>
+                </p:cond>
+              </p:nextCondLst>
+            </p:seq>
+          </p:childTnLst>
+        </p:cTn>
+      </p:par>
+    </p:tnLst>
+    <p:bldLst>
+      <p:bldP spid="2" grpId="0"/>
+      <p:bldP spid="4" grpId="0"/>
+      <p:bldP spid="5" grpId="0"/>
+    </p:bldLst>
+  </p:timing>
 </p:sld>
 </file>
 
@@ -6940,6 +7416,176 @@
   <p:clrMapOvr>
     <a:masterClrMapping/>
   </p:clrMapOvr>
+  <p:timing>
+    <p:tnLst>
+      <p:par>
+        <p:cTn id="1" dur="indefinite" restart="never" nodeType="tmRoot">
+          <p:childTnLst>
+            <p:seq concurrent="1" nextAc="seek">
+              <p:cTn id="2" dur="indefinite" nodeType="mainSeq">
+                <p:childTnLst>
+                  <p:par>
+                    <p:cTn id="3" fill="hold">
+                      <p:stCondLst>
+                        <p:cond delay="indefinite"/>
+                      </p:stCondLst>
+                      <p:childTnLst>
+                        <p:par>
+                          <p:cTn id="4" fill="hold">
+                            <p:stCondLst>
+                              <p:cond delay="0"/>
+                            </p:stCondLst>
+                            <p:childTnLst>
+                              <p:par>
+                                <p:cTn id="5" presetID="1" presetClass="entr" presetSubtype="0" fill="hold" grpId="0" nodeType="clickEffect">
+                                  <p:stCondLst>
+                                    <p:cond delay="0"/>
+                                  </p:stCondLst>
+                                  <p:childTnLst>
+                                    <p:set>
+                                      <p:cBhvr>
+                                        <p:cTn id="6" dur="1" fill="hold">
+                                          <p:stCondLst>
+                                            <p:cond delay="0"/>
+                                          </p:stCondLst>
+                                        </p:cTn>
+                                        <p:tgtEl>
+                                          <p:spTgt spid="2"/>
+                                        </p:tgtEl>
+                                        <p:attrNameLst>
+                                          <p:attrName>style.visibility</p:attrName>
+                                        </p:attrNameLst>
+                                      </p:cBhvr>
+                                      <p:to>
+                                        <p:strVal val="visible"/>
+                                      </p:to>
+                                    </p:set>
+                                  </p:childTnLst>
+                                </p:cTn>
+                              </p:par>
+                            </p:childTnLst>
+                          </p:cTn>
+                        </p:par>
+                      </p:childTnLst>
+                    </p:cTn>
+                  </p:par>
+                  <p:par>
+                    <p:cTn id="7" fill="hold">
+                      <p:stCondLst>
+                        <p:cond delay="indefinite"/>
+                      </p:stCondLst>
+                      <p:childTnLst>
+                        <p:par>
+                          <p:cTn id="8" fill="hold">
+                            <p:stCondLst>
+                              <p:cond delay="0"/>
+                            </p:stCondLst>
+                            <p:childTnLst>
+                              <p:par>
+                                <p:cTn id="9" presetID="1" presetClass="entr" presetSubtype="0" fill="hold" grpId="0" nodeType="clickEffect">
+                                  <p:stCondLst>
+                                    <p:cond delay="0"/>
+                                  </p:stCondLst>
+                                  <p:childTnLst>
+                                    <p:set>
+                                      <p:cBhvr>
+                                        <p:cTn id="10" dur="1" fill="hold">
+                                          <p:stCondLst>
+                                            <p:cond delay="0"/>
+                                          </p:stCondLst>
+                                        </p:cTn>
+                                        <p:tgtEl>
+                                          <p:spTgt spid="4"/>
+                                        </p:tgtEl>
+                                        <p:attrNameLst>
+                                          <p:attrName>style.visibility</p:attrName>
+                                        </p:attrNameLst>
+                                      </p:cBhvr>
+                                      <p:to>
+                                        <p:strVal val="visible"/>
+                                      </p:to>
+                                    </p:set>
+                                  </p:childTnLst>
+                                </p:cTn>
+                              </p:par>
+                            </p:childTnLst>
+                          </p:cTn>
+                        </p:par>
+                      </p:childTnLst>
+                    </p:cTn>
+                  </p:par>
+                  <p:par>
+                    <p:cTn id="11" fill="hold">
+                      <p:stCondLst>
+                        <p:cond delay="indefinite"/>
+                      </p:stCondLst>
+                      <p:childTnLst>
+                        <p:par>
+                          <p:cTn id="12" fill="hold">
+                            <p:stCondLst>
+                              <p:cond delay="0"/>
+                            </p:stCondLst>
+                            <p:childTnLst>
+                              <p:par>
+                                <p:cTn id="13" presetID="1" presetClass="entr" presetSubtype="0" fill="hold" grpId="0" nodeType="clickEffect">
+                                  <p:stCondLst>
+                                    <p:cond delay="0"/>
+                                  </p:stCondLst>
+                                  <p:childTnLst>
+                                    <p:set>
+                                      <p:cBhvr>
+                                        <p:cTn id="14" dur="1" fill="hold">
+                                          <p:stCondLst>
+                                            <p:cond delay="0"/>
+                                          </p:stCondLst>
+                                        </p:cTn>
+                                        <p:tgtEl>
+                                          <p:spTgt spid="5"/>
+                                        </p:tgtEl>
+                                        <p:attrNameLst>
+                                          <p:attrName>style.visibility</p:attrName>
+                                        </p:attrNameLst>
+                                      </p:cBhvr>
+                                      <p:to>
+                                        <p:strVal val="visible"/>
+                                      </p:to>
+                                    </p:set>
+                                  </p:childTnLst>
+                                </p:cTn>
+                              </p:par>
+                            </p:childTnLst>
+                          </p:cTn>
+                        </p:par>
+                      </p:childTnLst>
+                    </p:cTn>
+                  </p:par>
+                </p:childTnLst>
+              </p:cTn>
+              <p:prevCondLst>
+                <p:cond evt="onPrev" delay="0">
+                  <p:tgtEl>
+                    <p:sldTgt/>
+                  </p:tgtEl>
+                </p:cond>
+              </p:prevCondLst>
+              <p:nextCondLst>
+                <p:cond evt="onNext" delay="0">
+                  <p:tgtEl>
+                    <p:sldTgt/>
+                  </p:tgtEl>
+                </p:cond>
+              </p:nextCondLst>
+            </p:seq>
+          </p:childTnLst>
+        </p:cTn>
+      </p:par>
+    </p:tnLst>
+    <p:bldLst>
+      <p:bldP spid="2" grpId="0"/>
+      <p:bldP spid="4" grpId="0"/>
+      <p:bldP spid="5" grpId="0"/>
+    </p:bldLst>
+  </p:timing>
 </p:sld>
 </file>
 
@@ -7202,15 +7848,11 @@
             <a:pPr algn="ctr"/>
             <a:r>
               <a:rPr lang="en-CA" dirty="0" smtClean="0"/>
-              <a:t>“</a:t>
-            </a:r>
-            <a:r>
-              <a:rPr lang="en-CA" dirty="0" err="1" smtClean="0"/>
-              <a:t>print”,”if</a:t>
+              <a:t>“print", "if </a:t>
             </a:r>
             <a:r>
               <a:rPr lang="en-CA" dirty="0" smtClean="0"/>
-              <a:t> instructions”, ”while instructions”</a:t>
+              <a:t>instructions”, ”while instructions”</a:t>
             </a:r>
             <a:br>
               <a:rPr lang="en-CA" dirty="0" smtClean="0"/>
@@ -7229,6 +7871,176 @@
   <p:clrMapOvr>
     <a:masterClrMapping/>
   </p:clrMapOvr>
+  <p:timing>
+    <p:tnLst>
+      <p:par>
+        <p:cTn id="1" dur="indefinite" restart="never" nodeType="tmRoot">
+          <p:childTnLst>
+            <p:seq concurrent="1" nextAc="seek">
+              <p:cTn id="2" dur="indefinite" nodeType="mainSeq">
+                <p:childTnLst>
+                  <p:par>
+                    <p:cTn id="3" fill="hold">
+                      <p:stCondLst>
+                        <p:cond delay="indefinite"/>
+                      </p:stCondLst>
+                      <p:childTnLst>
+                        <p:par>
+                          <p:cTn id="4" fill="hold">
+                            <p:stCondLst>
+                              <p:cond delay="0"/>
+                            </p:stCondLst>
+                            <p:childTnLst>
+                              <p:par>
+                                <p:cTn id="5" presetID="1" presetClass="entr" presetSubtype="0" fill="hold" grpId="0" nodeType="clickEffect">
+                                  <p:stCondLst>
+                                    <p:cond delay="0"/>
+                                  </p:stCondLst>
+                                  <p:childTnLst>
+                                    <p:set>
+                                      <p:cBhvr>
+                                        <p:cTn id="6" dur="1" fill="hold">
+                                          <p:stCondLst>
+                                            <p:cond delay="0"/>
+                                          </p:stCondLst>
+                                        </p:cTn>
+                                        <p:tgtEl>
+                                          <p:spTgt spid="2"/>
+                                        </p:tgtEl>
+                                        <p:attrNameLst>
+                                          <p:attrName>style.visibility</p:attrName>
+                                        </p:attrNameLst>
+                                      </p:cBhvr>
+                                      <p:to>
+                                        <p:strVal val="visible"/>
+                                      </p:to>
+                                    </p:set>
+                                  </p:childTnLst>
+                                </p:cTn>
+                              </p:par>
+                            </p:childTnLst>
+                          </p:cTn>
+                        </p:par>
+                      </p:childTnLst>
+                    </p:cTn>
+                  </p:par>
+                  <p:par>
+                    <p:cTn id="7" fill="hold">
+                      <p:stCondLst>
+                        <p:cond delay="indefinite"/>
+                      </p:stCondLst>
+                      <p:childTnLst>
+                        <p:par>
+                          <p:cTn id="8" fill="hold">
+                            <p:stCondLst>
+                              <p:cond delay="0"/>
+                            </p:stCondLst>
+                            <p:childTnLst>
+                              <p:par>
+                                <p:cTn id="9" presetID="1" presetClass="entr" presetSubtype="0" fill="hold" grpId="0" nodeType="clickEffect">
+                                  <p:stCondLst>
+                                    <p:cond delay="0"/>
+                                  </p:stCondLst>
+                                  <p:childTnLst>
+                                    <p:set>
+                                      <p:cBhvr>
+                                        <p:cTn id="10" dur="1" fill="hold">
+                                          <p:stCondLst>
+                                            <p:cond delay="0"/>
+                                          </p:stCondLst>
+                                        </p:cTn>
+                                        <p:tgtEl>
+                                          <p:spTgt spid="4"/>
+                                        </p:tgtEl>
+                                        <p:attrNameLst>
+                                          <p:attrName>style.visibility</p:attrName>
+                                        </p:attrNameLst>
+                                      </p:cBhvr>
+                                      <p:to>
+                                        <p:strVal val="visible"/>
+                                      </p:to>
+                                    </p:set>
+                                  </p:childTnLst>
+                                </p:cTn>
+                              </p:par>
+                            </p:childTnLst>
+                          </p:cTn>
+                        </p:par>
+                      </p:childTnLst>
+                    </p:cTn>
+                  </p:par>
+                  <p:par>
+                    <p:cTn id="11" fill="hold">
+                      <p:stCondLst>
+                        <p:cond delay="indefinite"/>
+                      </p:stCondLst>
+                      <p:childTnLst>
+                        <p:par>
+                          <p:cTn id="12" fill="hold">
+                            <p:stCondLst>
+                              <p:cond delay="0"/>
+                            </p:stCondLst>
+                            <p:childTnLst>
+                              <p:par>
+                                <p:cTn id="13" presetID="1" presetClass="entr" presetSubtype="0" fill="hold" grpId="0" nodeType="clickEffect">
+                                  <p:stCondLst>
+                                    <p:cond delay="0"/>
+                                  </p:stCondLst>
+                                  <p:childTnLst>
+                                    <p:set>
+                                      <p:cBhvr>
+                                        <p:cTn id="14" dur="1" fill="hold">
+                                          <p:stCondLst>
+                                            <p:cond delay="0"/>
+                                          </p:stCondLst>
+                                        </p:cTn>
+                                        <p:tgtEl>
+                                          <p:spTgt spid="5"/>
+                                        </p:tgtEl>
+                                        <p:attrNameLst>
+                                          <p:attrName>style.visibility</p:attrName>
+                                        </p:attrNameLst>
+                                      </p:cBhvr>
+                                      <p:to>
+                                        <p:strVal val="visible"/>
+                                      </p:to>
+                                    </p:set>
+                                  </p:childTnLst>
+                                </p:cTn>
+                              </p:par>
+                            </p:childTnLst>
+                          </p:cTn>
+                        </p:par>
+                      </p:childTnLst>
+                    </p:cTn>
+                  </p:par>
+                </p:childTnLst>
+              </p:cTn>
+              <p:prevCondLst>
+                <p:cond evt="onPrev" delay="0">
+                  <p:tgtEl>
+                    <p:sldTgt/>
+                  </p:tgtEl>
+                </p:cond>
+              </p:prevCondLst>
+              <p:nextCondLst>
+                <p:cond evt="onNext" delay="0">
+                  <p:tgtEl>
+                    <p:sldTgt/>
+                  </p:tgtEl>
+                </p:cond>
+              </p:nextCondLst>
+            </p:seq>
+          </p:childTnLst>
+        </p:cTn>
+      </p:par>
+    </p:tnLst>
+    <p:bldLst>
+      <p:bldP spid="2" grpId="0"/>
+      <p:bldP spid="4" grpId="0"/>
+      <p:bldP spid="5" grpId="0"/>
+    </p:bldLst>
+  </p:timing>
 </p:sld>
 </file>
 
@@ -7508,6 +8320,176 @@
   <p:clrMapOvr>
     <a:masterClrMapping/>
   </p:clrMapOvr>
+  <p:timing>
+    <p:tnLst>
+      <p:par>
+        <p:cTn id="1" dur="indefinite" restart="never" nodeType="tmRoot">
+          <p:childTnLst>
+            <p:seq concurrent="1" nextAc="seek">
+              <p:cTn id="2" dur="indefinite" nodeType="mainSeq">
+                <p:childTnLst>
+                  <p:par>
+                    <p:cTn id="3" fill="hold">
+                      <p:stCondLst>
+                        <p:cond delay="indefinite"/>
+                      </p:stCondLst>
+                      <p:childTnLst>
+                        <p:par>
+                          <p:cTn id="4" fill="hold">
+                            <p:stCondLst>
+                              <p:cond delay="0"/>
+                            </p:stCondLst>
+                            <p:childTnLst>
+                              <p:par>
+                                <p:cTn id="5" presetID="1" presetClass="entr" presetSubtype="0" fill="hold" grpId="0" nodeType="clickEffect">
+                                  <p:stCondLst>
+                                    <p:cond delay="0"/>
+                                  </p:stCondLst>
+                                  <p:childTnLst>
+                                    <p:set>
+                                      <p:cBhvr>
+                                        <p:cTn id="6" dur="1" fill="hold">
+                                          <p:stCondLst>
+                                            <p:cond delay="0"/>
+                                          </p:stCondLst>
+                                        </p:cTn>
+                                        <p:tgtEl>
+                                          <p:spTgt spid="2"/>
+                                        </p:tgtEl>
+                                        <p:attrNameLst>
+                                          <p:attrName>style.visibility</p:attrName>
+                                        </p:attrNameLst>
+                                      </p:cBhvr>
+                                      <p:to>
+                                        <p:strVal val="visible"/>
+                                      </p:to>
+                                    </p:set>
+                                  </p:childTnLst>
+                                </p:cTn>
+                              </p:par>
+                            </p:childTnLst>
+                          </p:cTn>
+                        </p:par>
+                      </p:childTnLst>
+                    </p:cTn>
+                  </p:par>
+                  <p:par>
+                    <p:cTn id="7" fill="hold">
+                      <p:stCondLst>
+                        <p:cond delay="indefinite"/>
+                      </p:stCondLst>
+                      <p:childTnLst>
+                        <p:par>
+                          <p:cTn id="8" fill="hold">
+                            <p:stCondLst>
+                              <p:cond delay="0"/>
+                            </p:stCondLst>
+                            <p:childTnLst>
+                              <p:par>
+                                <p:cTn id="9" presetID="1" presetClass="entr" presetSubtype="0" fill="hold" grpId="0" nodeType="clickEffect">
+                                  <p:stCondLst>
+                                    <p:cond delay="0"/>
+                                  </p:stCondLst>
+                                  <p:childTnLst>
+                                    <p:set>
+                                      <p:cBhvr>
+                                        <p:cTn id="10" dur="1" fill="hold">
+                                          <p:stCondLst>
+                                            <p:cond delay="0"/>
+                                          </p:stCondLst>
+                                        </p:cTn>
+                                        <p:tgtEl>
+                                          <p:spTgt spid="4"/>
+                                        </p:tgtEl>
+                                        <p:attrNameLst>
+                                          <p:attrName>style.visibility</p:attrName>
+                                        </p:attrNameLst>
+                                      </p:cBhvr>
+                                      <p:to>
+                                        <p:strVal val="visible"/>
+                                      </p:to>
+                                    </p:set>
+                                  </p:childTnLst>
+                                </p:cTn>
+                              </p:par>
+                            </p:childTnLst>
+                          </p:cTn>
+                        </p:par>
+                      </p:childTnLst>
+                    </p:cTn>
+                  </p:par>
+                  <p:par>
+                    <p:cTn id="11" fill="hold">
+                      <p:stCondLst>
+                        <p:cond delay="indefinite"/>
+                      </p:stCondLst>
+                      <p:childTnLst>
+                        <p:par>
+                          <p:cTn id="12" fill="hold">
+                            <p:stCondLst>
+                              <p:cond delay="0"/>
+                            </p:stCondLst>
+                            <p:childTnLst>
+                              <p:par>
+                                <p:cTn id="13" presetID="1" presetClass="entr" presetSubtype="0" fill="hold" grpId="0" nodeType="clickEffect">
+                                  <p:stCondLst>
+                                    <p:cond delay="0"/>
+                                  </p:stCondLst>
+                                  <p:childTnLst>
+                                    <p:set>
+                                      <p:cBhvr>
+                                        <p:cTn id="14" dur="1" fill="hold">
+                                          <p:stCondLst>
+                                            <p:cond delay="0"/>
+                                          </p:stCondLst>
+                                        </p:cTn>
+                                        <p:tgtEl>
+                                          <p:spTgt spid="5"/>
+                                        </p:tgtEl>
+                                        <p:attrNameLst>
+                                          <p:attrName>style.visibility</p:attrName>
+                                        </p:attrNameLst>
+                                      </p:cBhvr>
+                                      <p:to>
+                                        <p:strVal val="visible"/>
+                                      </p:to>
+                                    </p:set>
+                                  </p:childTnLst>
+                                </p:cTn>
+                              </p:par>
+                            </p:childTnLst>
+                          </p:cTn>
+                        </p:par>
+                      </p:childTnLst>
+                    </p:cTn>
+                  </p:par>
+                </p:childTnLst>
+              </p:cTn>
+              <p:prevCondLst>
+                <p:cond evt="onPrev" delay="0">
+                  <p:tgtEl>
+                    <p:sldTgt/>
+                  </p:tgtEl>
+                </p:cond>
+              </p:prevCondLst>
+              <p:nextCondLst>
+                <p:cond evt="onNext" delay="0">
+                  <p:tgtEl>
+                    <p:sldTgt/>
+                  </p:tgtEl>
+                </p:cond>
+              </p:nextCondLst>
+            </p:seq>
+          </p:childTnLst>
+        </p:cTn>
+      </p:par>
+    </p:tnLst>
+    <p:bldLst>
+      <p:bldP spid="2" grpId="0"/>
+      <p:bldP spid="4" grpId="0"/>
+      <p:bldP spid="5" grpId="0"/>
+    </p:bldLst>
+  </p:timing>
 </p:sld>
 </file>
 
@@ -7567,6 +8549,13 @@
   <p:clrMapOvr>
     <a:masterClrMapping/>
   </p:clrMapOvr>
+  <p:timing>
+    <p:tnLst>
+      <p:par>
+        <p:cTn id="1" dur="indefinite" restart="never" nodeType="tmRoot"/>
+      </p:par>
+    </p:tnLst>
+  </p:timing>
 </p:sld>
 </file>
 

</xml_diff>